<commit_message>
wip scoring CALC interpretations
</commit_message>
<xml_diff>
--- a/ANALYSIS/MAIN/analysis/SGC3A/keys/_learn_111.pptx
+++ b/ANALYSIS/MAIN/analysis/SGC3A/keys/_learn_111.pptx
@@ -276,7 +276,7 @@
           <a:p>
             <a:fld id="{53779F68-5F10-A14E-84A0-800094737C2F}" type="datetimeFigureOut">
               <a:rPr lang="en-US" smtClean="0"/>
-              <a:t>5/4/22</a:t>
+              <a:t>5/9/22</a:t>
             </a:fld>
             <a:endParaRPr lang="en-US"/>
           </a:p>
@@ -474,7 +474,7 @@
           <a:p>
             <a:fld id="{53779F68-5F10-A14E-84A0-800094737C2F}" type="datetimeFigureOut">
               <a:rPr lang="en-US" smtClean="0"/>
-              <a:t>5/4/22</a:t>
+              <a:t>5/9/22</a:t>
             </a:fld>
             <a:endParaRPr lang="en-US"/>
           </a:p>
@@ -682,7 +682,7 @@
           <a:p>
             <a:fld id="{53779F68-5F10-A14E-84A0-800094737C2F}" type="datetimeFigureOut">
               <a:rPr lang="en-US" smtClean="0"/>
-              <a:t>5/4/22</a:t>
+              <a:t>5/9/22</a:t>
             </a:fld>
             <a:endParaRPr lang="en-US"/>
           </a:p>
@@ -880,7 +880,7 @@
           <a:p>
             <a:fld id="{53779F68-5F10-A14E-84A0-800094737C2F}" type="datetimeFigureOut">
               <a:rPr lang="en-US" smtClean="0"/>
-              <a:t>5/4/22</a:t>
+              <a:t>5/9/22</a:t>
             </a:fld>
             <a:endParaRPr lang="en-US"/>
           </a:p>
@@ -1155,7 +1155,7 @@
           <a:p>
             <a:fld id="{53779F68-5F10-A14E-84A0-800094737C2F}" type="datetimeFigureOut">
               <a:rPr lang="en-US" smtClean="0"/>
-              <a:t>5/4/22</a:t>
+              <a:t>5/9/22</a:t>
             </a:fld>
             <a:endParaRPr lang="en-US"/>
           </a:p>
@@ -1420,7 +1420,7 @@
           <a:p>
             <a:fld id="{53779F68-5F10-A14E-84A0-800094737C2F}" type="datetimeFigureOut">
               <a:rPr lang="en-US" smtClean="0"/>
-              <a:t>5/4/22</a:t>
+              <a:t>5/9/22</a:t>
             </a:fld>
             <a:endParaRPr lang="en-US"/>
           </a:p>
@@ -1832,7 +1832,7 @@
           <a:p>
             <a:fld id="{53779F68-5F10-A14E-84A0-800094737C2F}" type="datetimeFigureOut">
               <a:rPr lang="en-US" smtClean="0"/>
-              <a:t>5/4/22</a:t>
+              <a:t>5/9/22</a:t>
             </a:fld>
             <a:endParaRPr lang="en-US"/>
           </a:p>
@@ -1973,7 +1973,7 @@
           <a:p>
             <a:fld id="{53779F68-5F10-A14E-84A0-800094737C2F}" type="datetimeFigureOut">
               <a:rPr lang="en-US" smtClean="0"/>
-              <a:t>5/4/22</a:t>
+              <a:t>5/9/22</a:t>
             </a:fld>
             <a:endParaRPr lang="en-US"/>
           </a:p>
@@ -2086,7 +2086,7 @@
           <a:p>
             <a:fld id="{53779F68-5F10-A14E-84A0-800094737C2F}" type="datetimeFigureOut">
               <a:rPr lang="en-US" smtClean="0"/>
-              <a:t>5/4/22</a:t>
+              <a:t>5/9/22</a:t>
             </a:fld>
             <a:endParaRPr lang="en-US"/>
           </a:p>
@@ -2397,7 +2397,7 @@
           <a:p>
             <a:fld id="{53779F68-5F10-A14E-84A0-800094737C2F}" type="datetimeFigureOut">
               <a:rPr lang="en-US" smtClean="0"/>
-              <a:t>5/4/22</a:t>
+              <a:t>5/9/22</a:t>
             </a:fld>
             <a:endParaRPr lang="en-US"/>
           </a:p>
@@ -2685,7 +2685,7 @@
           <a:p>
             <a:fld id="{53779F68-5F10-A14E-84A0-800094737C2F}" type="datetimeFigureOut">
               <a:rPr lang="en-US" smtClean="0"/>
-              <a:t>5/4/22</a:t>
+              <a:t>5/9/22</a:t>
             </a:fld>
             <a:endParaRPr lang="en-US"/>
           </a:p>
@@ -2926,7 +2926,7 @@
           <a:p>
             <a:fld id="{53779F68-5F10-A14E-84A0-800094737C2F}" type="datetimeFigureOut">
               <a:rPr lang="en-US" smtClean="0"/>
-              <a:t>5/4/22</a:t>
+              <a:t>5/9/22</a:t>
             </a:fld>
             <a:endParaRPr lang="en-US"/>
           </a:p>
@@ -9892,8 +9892,8 @@
         </p:nvCxnSpPr>
         <p:spPr>
           <a:xfrm flipH="1">
-            <a:off x="9590730" y="5140038"/>
-            <a:ext cx="733410" cy="1463787"/>
+            <a:off x="9590730" y="3849155"/>
+            <a:ext cx="1372683" cy="2754670"/>
           </a:xfrm>
           <a:prstGeom prst="straightConnector1">
             <a:avLst/>
@@ -11374,6 +11374,67 @@
             <a:schemeClr val="accent6">
               <a:lumMod val="40000"/>
               <a:lumOff val="60000"/>
+            </a:schemeClr>
+          </a:solidFill>
+          <a:ln>
+            <a:solidFill>
+              <a:schemeClr val="accent6">
+                <a:lumMod val="40000"/>
+                <a:lumOff val="60000"/>
+              </a:schemeClr>
+            </a:solidFill>
+          </a:ln>
+        </p:spPr>
+        <p:style>
+          <a:lnRef idx="2">
+            <a:schemeClr val="accent1">
+              <a:shade val="50000"/>
+            </a:schemeClr>
+          </a:lnRef>
+          <a:fillRef idx="1">
+            <a:schemeClr val="accent1"/>
+          </a:fillRef>
+          <a:effectRef idx="0">
+            <a:schemeClr val="accent1"/>
+          </a:effectRef>
+          <a:fontRef idx="minor">
+            <a:schemeClr val="lt1"/>
+          </a:fontRef>
+        </p:style>
+        <p:txBody>
+          <a:bodyPr rtlCol="0" anchor="ctr"/>
+          <a:lstStyle/>
+          <a:p>
+            <a:pPr algn="ctr"/>
+            <a:endParaRPr lang="en-US"/>
+          </a:p>
+        </p:txBody>
+      </p:sp>
+      <p:sp>
+        <p:nvSpPr>
+          <p:cNvPr id="70" name="Oval 69">
+            <a:extLst>
+              <a:ext uri="{FF2B5EF4-FFF2-40B4-BE49-F238E27FC236}">
+                <a16:creationId xmlns:a16="http://schemas.microsoft.com/office/drawing/2014/main" id="{2FB25FC1-EC7E-B74B-BD37-60C0151BE2B7}"/>
+              </a:ext>
+            </a:extLst>
+          </p:cNvPr>
+          <p:cNvSpPr/>
+          <p:nvPr/>
+        </p:nvSpPr>
+        <p:spPr>
+          <a:xfrm>
+            <a:off x="10744315" y="4018801"/>
+            <a:ext cx="182880" cy="182880"/>
+          </a:xfrm>
+          <a:prstGeom prst="ellipse">
+            <a:avLst/>
+          </a:prstGeom>
+          <a:solidFill>
+            <a:schemeClr val="accent6">
+              <a:lumMod val="40000"/>
+              <a:lumOff val="60000"/>
+              <a:alpha val="25000"/>
             </a:schemeClr>
           </a:solidFill>
           <a:ln>
@@ -15465,6 +15526,115 @@
           </a:p>
         </p:txBody>
       </p:sp>
+      <p:sp>
+        <p:nvSpPr>
+          <p:cNvPr id="34" name="Oval 33">
+            <a:extLst>
+              <a:ext uri="{FF2B5EF4-FFF2-40B4-BE49-F238E27FC236}">
+                <a16:creationId xmlns:a16="http://schemas.microsoft.com/office/drawing/2014/main" id="{81E41339-C060-3246-88F7-F685649A09FD}"/>
+              </a:ext>
+            </a:extLst>
+          </p:cNvPr>
+          <p:cNvSpPr/>
+          <p:nvPr/>
+        </p:nvSpPr>
+        <p:spPr>
+          <a:xfrm>
+            <a:off x="10723233" y="3862278"/>
+            <a:ext cx="182881" cy="182880"/>
+          </a:xfrm>
+          <a:prstGeom prst="ellipse">
+            <a:avLst/>
+          </a:prstGeom>
+          <a:solidFill>
+            <a:schemeClr val="accent6">
+              <a:lumMod val="40000"/>
+              <a:lumOff val="60000"/>
+              <a:alpha val="25000"/>
+            </a:schemeClr>
+          </a:solidFill>
+          <a:ln>
+            <a:solidFill>
+              <a:schemeClr val="accent6">
+                <a:lumMod val="40000"/>
+                <a:lumOff val="60000"/>
+              </a:schemeClr>
+            </a:solidFill>
+          </a:ln>
+        </p:spPr>
+        <p:style>
+          <a:lnRef idx="2">
+            <a:schemeClr val="accent1">
+              <a:shade val="50000"/>
+            </a:schemeClr>
+          </a:lnRef>
+          <a:fillRef idx="1">
+            <a:schemeClr val="accent1"/>
+          </a:fillRef>
+          <a:effectRef idx="0">
+            <a:schemeClr val="accent1"/>
+          </a:effectRef>
+          <a:fontRef idx="minor">
+            <a:schemeClr val="lt1"/>
+          </a:fontRef>
+        </p:style>
+        <p:txBody>
+          <a:bodyPr rtlCol="0" anchor="ctr"/>
+          <a:lstStyle/>
+          <a:p>
+            <a:pPr algn="ctr"/>
+            <a:endParaRPr lang="en-US"/>
+          </a:p>
+        </p:txBody>
+      </p:sp>
+      <p:cxnSp>
+        <p:nvCxnSpPr>
+          <p:cNvPr id="35" name="Straight Arrow Connector 34">
+            <a:extLst>
+              <a:ext uri="{FF2B5EF4-FFF2-40B4-BE49-F238E27FC236}">
+                <a16:creationId xmlns:a16="http://schemas.microsoft.com/office/drawing/2014/main" id="{0543372A-A828-BE4F-BEBD-0C57B683E39F}"/>
+              </a:ext>
+            </a:extLst>
+          </p:cNvPr>
+          <p:cNvCxnSpPr>
+            <a:cxnSpLocks/>
+          </p:cNvCxnSpPr>
+          <p:nvPr/>
+        </p:nvCxnSpPr>
+        <p:spPr>
+          <a:xfrm flipH="1" flipV="1">
+            <a:off x="10688828" y="3711707"/>
+            <a:ext cx="1372594" cy="2745460"/>
+          </a:xfrm>
+          <a:prstGeom prst="straightConnector1">
+            <a:avLst/>
+          </a:prstGeom>
+          <a:ln w="12700">
+            <a:solidFill>
+              <a:schemeClr val="accent6">
+                <a:lumMod val="40000"/>
+                <a:lumOff val="60000"/>
+              </a:schemeClr>
+            </a:solidFill>
+            <a:prstDash val="dash"/>
+            <a:tailEnd type="triangle"/>
+          </a:ln>
+        </p:spPr>
+        <p:style>
+          <a:lnRef idx="1">
+            <a:schemeClr val="accent1"/>
+          </a:lnRef>
+          <a:fillRef idx="0">
+            <a:schemeClr val="accent1"/>
+          </a:fillRef>
+          <a:effectRef idx="0">
+            <a:schemeClr val="accent1"/>
+          </a:effectRef>
+          <a:fontRef idx="minor">
+            <a:schemeClr val="tx1"/>
+          </a:fontRef>
+        </p:style>
+      </p:cxnSp>
     </p:spTree>
     <p:extLst>
       <p:ext uri="{BB962C8B-B14F-4D97-AF65-F5344CB8AC3E}">

</xml_diff>